<commit_message>
Added subsection on Fluent syntax to LINQ chapter
Plus minor updates to DBandVS presentation.
</commit_message>
<xml_diff>
--- a/Chap/DB/Presentations/DBandVS.pptx
+++ b/Chap/DB/Presentations/DBandVS.pptx
@@ -297,7 +297,7 @@
           <a:p>
             <a:fld id="{E15B7D8E-2A20-4C0E-991C-872DBB7459A8}" type="datetimeFigureOut">
               <a:rPr lang="da-DK" smtClean="0"/>
-              <a:t>29-09-2018</a:t>
+              <a:t>30-09-2018</a:t>
             </a:fld>
             <a:endParaRPr lang="da-DK"/>
           </a:p>
@@ -467,7 +467,7 @@
           <a:p>
             <a:fld id="{E15B7D8E-2A20-4C0E-991C-872DBB7459A8}" type="datetimeFigureOut">
               <a:rPr lang="da-DK" smtClean="0"/>
-              <a:t>29-09-2018</a:t>
+              <a:t>30-09-2018</a:t>
             </a:fld>
             <a:endParaRPr lang="da-DK"/>
           </a:p>
@@ -647,7 +647,7 @@
           <a:p>
             <a:fld id="{E15B7D8E-2A20-4C0E-991C-872DBB7459A8}" type="datetimeFigureOut">
               <a:rPr lang="da-DK" smtClean="0"/>
-              <a:t>29-09-2018</a:t>
+              <a:t>30-09-2018</a:t>
             </a:fld>
             <a:endParaRPr lang="da-DK"/>
           </a:p>
@@ -817,7 +817,7 @@
           <a:p>
             <a:fld id="{E15B7D8E-2A20-4C0E-991C-872DBB7459A8}" type="datetimeFigureOut">
               <a:rPr lang="da-DK" smtClean="0"/>
-              <a:t>29-09-2018</a:t>
+              <a:t>30-09-2018</a:t>
             </a:fld>
             <a:endParaRPr lang="da-DK"/>
           </a:p>
@@ -1063,7 +1063,7 @@
           <a:p>
             <a:fld id="{E15B7D8E-2A20-4C0E-991C-872DBB7459A8}" type="datetimeFigureOut">
               <a:rPr lang="da-DK" smtClean="0"/>
-              <a:t>29-09-2018</a:t>
+              <a:t>30-09-2018</a:t>
             </a:fld>
             <a:endParaRPr lang="da-DK"/>
           </a:p>
@@ -1295,7 +1295,7 @@
           <a:p>
             <a:fld id="{E15B7D8E-2A20-4C0E-991C-872DBB7459A8}" type="datetimeFigureOut">
               <a:rPr lang="da-DK" smtClean="0"/>
-              <a:t>29-09-2018</a:t>
+              <a:t>30-09-2018</a:t>
             </a:fld>
             <a:endParaRPr lang="da-DK"/>
           </a:p>
@@ -1662,7 +1662,7 @@
           <a:p>
             <a:fld id="{E15B7D8E-2A20-4C0E-991C-872DBB7459A8}" type="datetimeFigureOut">
               <a:rPr lang="da-DK" smtClean="0"/>
-              <a:t>29-09-2018</a:t>
+              <a:t>30-09-2018</a:t>
             </a:fld>
             <a:endParaRPr lang="da-DK"/>
           </a:p>
@@ -1780,7 +1780,7 @@
           <a:p>
             <a:fld id="{E15B7D8E-2A20-4C0E-991C-872DBB7459A8}" type="datetimeFigureOut">
               <a:rPr lang="da-DK" smtClean="0"/>
-              <a:t>29-09-2018</a:t>
+              <a:t>30-09-2018</a:t>
             </a:fld>
             <a:endParaRPr lang="da-DK"/>
           </a:p>
@@ -1875,7 +1875,7 @@
           <a:p>
             <a:fld id="{E15B7D8E-2A20-4C0E-991C-872DBB7459A8}" type="datetimeFigureOut">
               <a:rPr lang="da-DK" smtClean="0"/>
-              <a:t>29-09-2018</a:t>
+              <a:t>30-09-2018</a:t>
             </a:fld>
             <a:endParaRPr lang="da-DK"/>
           </a:p>
@@ -2152,7 +2152,7 @@
           <a:p>
             <a:fld id="{E15B7D8E-2A20-4C0E-991C-872DBB7459A8}" type="datetimeFigureOut">
               <a:rPr lang="da-DK" smtClean="0"/>
-              <a:t>29-09-2018</a:t>
+              <a:t>30-09-2018</a:t>
             </a:fld>
             <a:endParaRPr lang="da-DK"/>
           </a:p>
@@ -2405,7 +2405,7 @@
           <a:p>
             <a:fld id="{E15B7D8E-2A20-4C0E-991C-872DBB7459A8}" type="datetimeFigureOut">
               <a:rPr lang="da-DK" smtClean="0"/>
-              <a:t>29-09-2018</a:t>
+              <a:t>30-09-2018</a:t>
             </a:fld>
             <a:endParaRPr lang="da-DK"/>
           </a:p>
@@ -2618,7 +2618,7 @@
           <a:p>
             <a:fld id="{E15B7D8E-2A20-4C0E-991C-872DBB7459A8}" type="datetimeFigureOut">
               <a:rPr lang="da-DK" smtClean="0"/>
-              <a:t>29-09-2018</a:t>
+              <a:t>30-09-2018</a:t>
             </a:fld>
             <a:endParaRPr lang="da-DK"/>
           </a:p>
@@ -4828,19 +4828,7 @@
             </a:r>
             <a:r>
               <a:rPr lang="da-DK" sz="2400" smtClean="0"/>
-              <a:t> </a:t>
-            </a:r>
-            <a:r>
-              <a:rPr lang="da-DK" sz="2400" smtClean="0"/>
-              <a:t>new </a:t>
-            </a:r>
-            <a:r>
-              <a:rPr lang="da-DK" sz="2400" smtClean="0"/>
-              <a:t>table has been </a:t>
-            </a:r>
-            <a:r>
-              <a:rPr lang="da-DK" sz="2400" smtClean="0"/>
-              <a:t>added to MyFirstDB </a:t>
+              <a:t> new table has been added to MyFirstDB </a:t>
             </a:r>
             <a:r>
               <a:rPr lang="da-DK" sz="2400" smtClean="0">
@@ -5191,7 +5179,15 @@
             <a:pPr lvl="1"/>
             <a:r>
               <a:rPr lang="da-DK" sz="2800" smtClean="0"/>
-              <a:t>Create tables, row, etc. by using a given database </a:t>
+              <a:t>Create tables, </a:t>
+            </a:r>
+            <a:r>
+              <a:rPr lang="da-DK" sz="2800" smtClean="0"/>
+              <a:t>rows, </a:t>
+            </a:r>
+            <a:r>
+              <a:rPr lang="da-DK" sz="2800" smtClean="0"/>
+              <a:t>etc. by using a given database </a:t>
             </a:r>
             <a:r>
               <a:rPr lang="da-DK" sz="2800" b="1" smtClean="0"/>
@@ -5309,11 +5305,7 @@
             </a:r>
             <a:r>
               <a:rPr lang="da-DK" sz="2400" smtClean="0"/>
-              <a:t> </a:t>
-            </a:r>
-            <a:r>
-              <a:rPr lang="da-DK" sz="2400" smtClean="0"/>
-              <a:t>table, and choose </a:t>
+              <a:t> table, and choose </a:t>
             </a:r>
             <a:r>
               <a:rPr lang="da-DK" sz="2400" b="1" smtClean="0"/>
@@ -5511,19 +5503,7 @@
             </a:r>
             <a:r>
               <a:rPr lang="da-DK" sz="2400" smtClean="0"/>
-              <a:t> </a:t>
-            </a:r>
-            <a:r>
-              <a:rPr lang="da-DK" sz="2400" smtClean="0"/>
-              <a:t>table contains </a:t>
-            </a:r>
-            <a:r>
-              <a:rPr lang="da-DK" sz="2400" smtClean="0"/>
-              <a:t>15 </a:t>
-            </a:r>
-            <a:r>
-              <a:rPr lang="da-DK" sz="2400" smtClean="0"/>
-              <a:t>rows</a:t>
+              <a:t> table contains 15 rows</a:t>
             </a:r>
             <a:endParaRPr lang="da-DK" sz="2400" b="1"/>
           </a:p>
@@ -5725,13 +5705,13 @@
   <p:clrMapOvr>
     <a:masterClrMapping/>
   </p:clrMapOvr>
-  <mc:AlternateContent xmlns:mc="http://schemas.openxmlformats.org/markup-compatibility/2006">
-    <mc:Choice xmlns:p14="http://schemas.microsoft.com/office/powerpoint/2010/main" Requires="p14">
+  <mc:AlternateContent xmlns:mc="http://schemas.openxmlformats.org/markup-compatibility/2006" xmlns:p14="http://schemas.microsoft.com/office/powerpoint/2010/main">
+    <mc:Choice Requires="p14">
       <p:transition spd="med" p14:dur="700">
         <p:fade/>
       </p:transition>
     </mc:Choice>
-    <mc:Fallback>
+    <mc:Fallback xmlns="">
       <p:transition spd="med">
         <p:fade/>
       </p:transition>
@@ -6022,11 +6002,7 @@
             </a:r>
             <a:r>
               <a:rPr lang="da-DK" sz="2400" smtClean="0"/>
-              <a:t> </a:t>
-            </a:r>
-            <a:r>
-              <a:rPr lang="da-DK" sz="2400" smtClean="0"/>
-              <a:t>table, and choose </a:t>
+              <a:t> table, and choose </a:t>
             </a:r>
             <a:r>
               <a:rPr lang="da-DK" sz="2400" b="1" smtClean="0"/>
@@ -6224,11 +6200,7 @@
             </a:r>
             <a:r>
               <a:rPr lang="da-DK" sz="2400" smtClean="0"/>
-              <a:t> </a:t>
-            </a:r>
-            <a:r>
-              <a:rPr lang="da-DK" sz="2400" smtClean="0"/>
-              <a:t>table (designer view)</a:t>
+              <a:t> table (designer view)</a:t>
             </a:r>
             <a:endParaRPr lang="da-DK" sz="2400" b="1"/>
           </a:p>
@@ -6522,11 +6494,7 @@
             </a:r>
             <a:r>
               <a:rPr lang="da-DK" sz="2400" smtClean="0"/>
-              <a:t> </a:t>
-            </a:r>
-            <a:r>
-              <a:rPr lang="da-DK" sz="2400" smtClean="0"/>
-              <a:t>table (SQL code view)</a:t>
+              <a:t> table (SQL code view)</a:t>
             </a:r>
             <a:endParaRPr lang="da-DK" sz="2400" b="1"/>
           </a:p>
@@ -8213,11 +8181,7 @@
           <a:p>
             <a:r>
               <a:rPr lang="da-DK" sz="2400" smtClean="0"/>
-              <a:t>Main SQL </a:t>
-            </a:r>
-            <a:r>
-              <a:rPr lang="da-DK" sz="2400" smtClean="0"/>
-              <a:t>keywords in blue </a:t>
+              <a:t>Main SQL keywords in blue </a:t>
             </a:r>
             <a:endParaRPr lang="da-DK" sz="2400" b="1"/>
           </a:p>

</xml_diff>